<commit_message>
Aula 08 Cloud IoT Python Indústria 4.0 e Outros 09maio2023
</commit_message>
<xml_diff>
--- a/01 Classes/Aula 08 - Aplicação Cloud Indústria 40 Python IoT - Tecnologias Emergentes.pptx
+++ b/01 Classes/Aula 08 - Aplicação Cloud Indústria 40 Python IoT - Tecnologias Emergentes.pptx
@@ -5,7 +5,7 @@
     <p:sldMasterId id="2147483648" r:id="rId1"/>
   </p:sldMasterIdLst>
   <p:notesMasterIdLst>
-    <p:notesMasterId r:id="rId30"/>
+    <p:notesMasterId r:id="rId32"/>
   </p:notesMasterIdLst>
   <p:sldIdLst>
     <p:sldId id="256" r:id="rId2"/>
@@ -34,8 +34,10 @@
     <p:sldId id="333" r:id="rId25"/>
     <p:sldId id="323" r:id="rId26"/>
     <p:sldId id="345" r:id="rId27"/>
-    <p:sldId id="337" r:id="rId28"/>
-    <p:sldId id="309" r:id="rId29"/>
+    <p:sldId id="369" r:id="rId28"/>
+    <p:sldId id="368" r:id="rId29"/>
+    <p:sldId id="337" r:id="rId30"/>
+    <p:sldId id="309" r:id="rId31"/>
   </p:sldIdLst>
   <p:sldSz cx="9144000" cy="5143500" type="screen16x9"/>
   <p:notesSz cx="6858000" cy="9144000"/>
@@ -1705,6 +1707,138 @@
 </file>
 
 <file path=ppt/notesSlides/notesSlide26.xml><?xml version="1.0" encoding="utf-8"?>
+<p:notes xmlns:a="http://schemas.openxmlformats.org/drawingml/2006/main" xmlns:r="http://schemas.openxmlformats.org/officeDocument/2006/relationships" xmlns:p="http://schemas.openxmlformats.org/presentationml/2006/main">
+  <p:cSld>
+    <p:spTree>
+      <p:nvGrpSpPr>
+        <p:cNvPr id="1" name=""/>
+        <p:cNvGrpSpPr/>
+        <p:nvPr/>
+      </p:nvGrpSpPr>
+      <p:grpSpPr>
+        <a:xfrm>
+          <a:off x="0" y="0"/>
+          <a:ext cx="0" cy="0"/>
+          <a:chOff x="0" y="0"/>
+          <a:chExt cx="0" cy="0"/>
+        </a:xfrm>
+      </p:grpSpPr>
+      <p:sp>
+        <p:nvSpPr>
+          <p:cNvPr id="2" name="Espaço Reservado para Imagem de Slide 1"/>
+          <p:cNvSpPr>
+            <a:spLocks noGrp="1" noRot="1" noChangeAspect="1"/>
+          </p:cNvSpPr>
+          <p:nvPr>
+            <p:ph type="sldImg"/>
+          </p:nvPr>
+        </p:nvSpPr>
+        <p:spPr>
+          <a:xfrm>
+            <a:off x="381000" y="685800"/>
+            <a:ext cx="6096000" cy="3429000"/>
+          </a:xfrm>
+        </p:spPr>
+      </p:sp>
+      <p:sp>
+        <p:nvSpPr>
+          <p:cNvPr id="3" name="Espaço Reservado para Anotações 2"/>
+          <p:cNvSpPr>
+            <a:spLocks noGrp="1"/>
+          </p:cNvSpPr>
+          <p:nvPr>
+            <p:ph type="body" idx="1"/>
+          </p:nvPr>
+        </p:nvSpPr>
+        <p:spPr/>
+        <p:txBody>
+          <a:bodyPr/>
+          <a:lstStyle/>
+          <a:p>
+            <a:endParaRPr lang="pt-BR" dirty="0"/>
+          </a:p>
+        </p:txBody>
+      </p:sp>
+    </p:spTree>
+    <p:extLst>
+      <p:ext uri="{BB962C8B-B14F-4D97-AF65-F5344CB8AC3E}">
+        <p14:creationId xmlns:p14="http://schemas.microsoft.com/office/powerpoint/2010/main" val="169529413"/>
+      </p:ext>
+    </p:extLst>
+  </p:cSld>
+  <p:clrMapOvr>
+    <a:masterClrMapping/>
+  </p:clrMapOvr>
+</p:notes>
+</file>
+
+<file path=ppt/notesSlides/notesSlide27.xml><?xml version="1.0" encoding="utf-8"?>
+<p:notes xmlns:a="http://schemas.openxmlformats.org/drawingml/2006/main" xmlns:r="http://schemas.openxmlformats.org/officeDocument/2006/relationships" xmlns:p="http://schemas.openxmlformats.org/presentationml/2006/main">
+  <p:cSld>
+    <p:spTree>
+      <p:nvGrpSpPr>
+        <p:cNvPr id="1" name=""/>
+        <p:cNvGrpSpPr/>
+        <p:nvPr/>
+      </p:nvGrpSpPr>
+      <p:grpSpPr>
+        <a:xfrm>
+          <a:off x="0" y="0"/>
+          <a:ext cx="0" cy="0"/>
+          <a:chOff x="0" y="0"/>
+          <a:chExt cx="0" cy="0"/>
+        </a:xfrm>
+      </p:grpSpPr>
+      <p:sp>
+        <p:nvSpPr>
+          <p:cNvPr id="2" name="Espaço Reservado para Imagem de Slide 1"/>
+          <p:cNvSpPr>
+            <a:spLocks noGrp="1" noRot="1" noChangeAspect="1"/>
+          </p:cNvSpPr>
+          <p:nvPr>
+            <p:ph type="sldImg"/>
+          </p:nvPr>
+        </p:nvSpPr>
+        <p:spPr>
+          <a:xfrm>
+            <a:off x="381000" y="685800"/>
+            <a:ext cx="6096000" cy="3429000"/>
+          </a:xfrm>
+        </p:spPr>
+      </p:sp>
+      <p:sp>
+        <p:nvSpPr>
+          <p:cNvPr id="3" name="Espaço Reservado para Anotações 2"/>
+          <p:cNvSpPr>
+            <a:spLocks noGrp="1"/>
+          </p:cNvSpPr>
+          <p:nvPr>
+            <p:ph type="body" idx="1"/>
+          </p:nvPr>
+        </p:nvSpPr>
+        <p:spPr/>
+        <p:txBody>
+          <a:bodyPr/>
+          <a:lstStyle/>
+          <a:p>
+            <a:endParaRPr lang="pt-BR" dirty="0"/>
+          </a:p>
+        </p:txBody>
+      </p:sp>
+    </p:spTree>
+    <p:extLst>
+      <p:ext uri="{BB962C8B-B14F-4D97-AF65-F5344CB8AC3E}">
+        <p14:creationId xmlns:p14="http://schemas.microsoft.com/office/powerpoint/2010/main" val="3361836292"/>
+      </p:ext>
+    </p:extLst>
+  </p:cSld>
+  <p:clrMapOvr>
+    <a:masterClrMapping/>
+  </p:clrMapOvr>
+</p:notes>
+</file>
+
+<file path=ppt/notesSlides/notesSlide28.xml><?xml version="1.0" encoding="utf-8"?>
 <p:notes xmlns:a="http://schemas.openxmlformats.org/drawingml/2006/main" xmlns:r="http://schemas.openxmlformats.org/officeDocument/2006/relationships" xmlns:p="http://schemas.openxmlformats.org/presentationml/2006/main">
   <p:cSld>
     <p:spTree>
@@ -8560,7 +8694,7 @@
                 <a:latin typeface="Times New Roman" panose="02020603050405020304" pitchFamily="18" charset="0"/>
                 <a:cs typeface="Times New Roman" panose="02020603050405020304" pitchFamily="18" charset="0"/>
               </a:rPr>
-              <a:t>Haddop</a:t>
+              <a:t>Hadoop</a:t>
             </a:r>
             <a:endParaRPr lang="pt-BR" sz="2000" dirty="0">
               <a:latin typeface="Times New Roman" panose="02020603050405020304" pitchFamily="18" charset="0"/>
@@ -8922,7 +9056,21 @@
                 <a:latin typeface="Times New Roman" panose="02020603050405020304" pitchFamily="18" charset="0"/>
                 <a:cs typeface="Times New Roman" panose="02020603050405020304" pitchFamily="18" charset="0"/>
               </a:rPr>
-              <a:t>Simulação em 3D</a:t>
+              <a:t>Simulação em 3D (</a:t>
+            </a:r>
+            <a:r>
+              <a:rPr lang="pt-BR" sz="2000" b="1" dirty="0">
+                <a:latin typeface="Times New Roman" panose="02020603050405020304" pitchFamily="18" charset="0"/>
+                <a:cs typeface="Times New Roman" panose="02020603050405020304" pitchFamily="18" charset="0"/>
+              </a:rPr>
+              <a:t>Prototipagem, Design</a:t>
+            </a:r>
+            <a:r>
+              <a:rPr lang="pt-BR" sz="2000" dirty="0">
+                <a:latin typeface="Times New Roman" panose="02020603050405020304" pitchFamily="18" charset="0"/>
+                <a:cs typeface="Times New Roman" panose="02020603050405020304" pitchFamily="18" charset="0"/>
+              </a:rPr>
+              <a:t>); Sistemas autônomos</a:t>
             </a:r>
           </a:p>
         </p:txBody>
@@ -9095,6 +9243,26 @@
             <a:pPr marL="0" indent="0" algn="just">
               <a:buNone/>
             </a:pPr>
+            <a:r>
+              <a:rPr lang="pt-BR" sz="1800" dirty="0">
+                <a:latin typeface="Times New Roman" panose="02020603050405020304" pitchFamily="18" charset="0"/>
+                <a:cs typeface="Times New Roman" panose="02020603050405020304" pitchFamily="18" charset="0"/>
+                <a:hlinkClick r:id="rId4"/>
+              </a:rPr>
+              <a:t>https://skyone.solutions/hub/tendencias-de-inovacao-na-industria/</a:t>
+            </a:r>
+            <a:r>
+              <a:rPr lang="pt-BR" sz="1800" dirty="0">
+                <a:latin typeface="Times New Roman" panose="02020603050405020304" pitchFamily="18" charset="0"/>
+                <a:cs typeface="Times New Roman" panose="02020603050405020304" pitchFamily="18" charset="0"/>
+              </a:rPr>
+              <a:t> </a:t>
+            </a:r>
+          </a:p>
+          <a:p>
+            <a:pPr marL="0" indent="0" algn="just">
+              <a:buNone/>
+            </a:pPr>
             <a:endParaRPr lang="pt-BR" sz="1800" dirty="0">
               <a:latin typeface="Times New Roman" panose="02020603050405020304" pitchFamily="18" charset="0"/>
               <a:cs typeface="Times New Roman" panose="02020603050405020304" pitchFamily="18" charset="0"/>
@@ -9149,7 +9317,7 @@
               <a:rPr lang="pt-BR" sz="1800" dirty="0">
                 <a:latin typeface="Times New Roman" panose="02020603050405020304" pitchFamily="18" charset="0"/>
                 <a:cs typeface="Times New Roman" panose="02020603050405020304" pitchFamily="18" charset="0"/>
-                <a:hlinkClick r:id="rId4"/>
+                <a:hlinkClick r:id="rId5"/>
               </a:rPr>
               <a:t>http://educa.fcc.org.br/scielo.php?pid=S2178-52012020000100124&amp;script=sci_arttext</a:t>
             </a:r>
@@ -9165,7 +9333,7 @@
             <a:endParaRPr lang="pt-BR" sz="1800" dirty="0">
               <a:latin typeface="Times New Roman" panose="02020603050405020304" pitchFamily="18" charset="0"/>
               <a:cs typeface="Times New Roman" panose="02020603050405020304" pitchFamily="18" charset="0"/>
-              <a:hlinkClick r:id="rId5"/>
+              <a:hlinkClick r:id="rId6"/>
             </a:endParaRPr>
           </a:p>
           <a:p>
@@ -9176,7 +9344,7 @@
               <a:rPr lang="pt-BR" sz="1800" dirty="0">
                 <a:latin typeface="Times New Roman" panose="02020603050405020304" pitchFamily="18" charset="0"/>
                 <a:cs typeface="Times New Roman" panose="02020603050405020304" pitchFamily="18" charset="0"/>
-                <a:hlinkClick r:id="rId5"/>
+                <a:hlinkClick r:id="rId6"/>
               </a:rPr>
               <a:t>https://www.ey.com/pt_br/consulting/how-emerging-technologies-can-usher-in-the-dawn-of-pervasive-intelligence</a:t>
             </a:r>
@@ -9527,34 +9695,120 @@
               <a:buNone/>
             </a:pPr>
             <a:r>
-              <a:rPr lang="pt-BR" sz="2400" dirty="0">
-                <a:latin typeface="Times New Roman" panose="02020603050405020304" pitchFamily="18" charset="0"/>
-                <a:cs typeface="Times New Roman" panose="02020603050405020304" pitchFamily="18" charset="0"/>
-              </a:rPr>
-              <a:t>Praticar - Reproduzir Soluções Python de </a:t>
-            </a:r>
-            <a:r>
-              <a:rPr lang="pt-BR" sz="2400" dirty="0" err="1">
+              <a:rPr lang="pt-BR" sz="2000" b="1" dirty="0">
+                <a:latin typeface="Times New Roman" panose="02020603050405020304" pitchFamily="18" charset="0"/>
+                <a:cs typeface="Times New Roman" panose="02020603050405020304" pitchFamily="18" charset="0"/>
+              </a:rPr>
+              <a:t>Praticar</a:t>
+            </a:r>
+            <a:r>
+              <a:rPr lang="pt-BR" sz="2000" dirty="0">
+                <a:latin typeface="Times New Roman" panose="02020603050405020304" pitchFamily="18" charset="0"/>
+                <a:cs typeface="Times New Roman" panose="02020603050405020304" pitchFamily="18" charset="0"/>
+              </a:rPr>
+              <a:t> - Reproduzir </a:t>
+            </a:r>
+            <a:r>
+              <a:rPr lang="pt-BR" sz="2000" b="1" dirty="0">
+                <a:solidFill>
+                  <a:schemeClr val="tx1"/>
+                </a:solidFill>
+                <a:latin typeface="Times New Roman" panose="02020603050405020304" pitchFamily="18" charset="0"/>
+                <a:cs typeface="Times New Roman" panose="02020603050405020304" pitchFamily="18" charset="0"/>
+              </a:rPr>
+              <a:t>Soluções Python </a:t>
+            </a:r>
+            <a:r>
+              <a:rPr lang="pt-BR" sz="2000" b="1" dirty="0">
+                <a:solidFill>
+                  <a:srgbClr val="FF0000"/>
+                </a:solidFill>
+                <a:latin typeface="Times New Roman" panose="02020603050405020304" pitchFamily="18" charset="0"/>
+                <a:cs typeface="Times New Roman" panose="02020603050405020304" pitchFamily="18" charset="0"/>
+              </a:rPr>
+              <a:t>de </a:t>
+            </a:r>
+            <a:r>
+              <a:rPr lang="pt-BR" sz="2000" b="1" dirty="0" err="1">
+                <a:solidFill>
+                  <a:srgbClr val="FF0000"/>
+                </a:solidFill>
                 <a:latin typeface="Times New Roman" panose="02020603050405020304" pitchFamily="18" charset="0"/>
                 <a:cs typeface="Times New Roman" panose="02020603050405020304" pitchFamily="18" charset="0"/>
               </a:rPr>
               <a:t>Tomi</a:t>
             </a:r>
             <a:r>
-              <a:rPr lang="pt-BR" sz="2400" dirty="0">
+              <a:rPr lang="pt-BR" sz="2000" b="1" dirty="0">
+                <a:solidFill>
+                  <a:srgbClr val="FF0000"/>
+                </a:solidFill>
                 <a:latin typeface="Times New Roman" panose="02020603050405020304" pitchFamily="18" charset="0"/>
                 <a:cs typeface="Times New Roman" panose="02020603050405020304" pitchFamily="18" charset="0"/>
               </a:rPr>
               <a:t> </a:t>
             </a:r>
             <a:r>
-              <a:rPr lang="pt-BR" sz="2400" dirty="0" err="1">
+              <a:rPr lang="pt-BR" sz="2000" b="1" dirty="0" err="1">
+                <a:solidFill>
+                  <a:srgbClr val="FF0000"/>
+                </a:solidFill>
                 <a:latin typeface="Times New Roman" panose="02020603050405020304" pitchFamily="18" charset="0"/>
                 <a:cs typeface="Times New Roman" panose="02020603050405020304" pitchFamily="18" charset="0"/>
               </a:rPr>
               <a:t>Tokko</a:t>
             </a:r>
-            <a:endParaRPr lang="pt-BR" sz="2400" dirty="0">
+            <a:r>
+              <a:rPr lang="pt-BR" sz="2000" b="1" dirty="0">
+                <a:solidFill>
+                  <a:srgbClr val="FF0000"/>
+                </a:solidFill>
+                <a:latin typeface="Times New Roman" panose="02020603050405020304" pitchFamily="18" charset="0"/>
+                <a:cs typeface="Times New Roman" panose="02020603050405020304" pitchFamily="18" charset="0"/>
+              </a:rPr>
+              <a:t>, </a:t>
+            </a:r>
+            <a:r>
+              <a:rPr lang="pt-BR" sz="2000" dirty="0">
+                <a:latin typeface="Times New Roman" panose="02020603050405020304" pitchFamily="18" charset="0"/>
+                <a:cs typeface="Times New Roman" panose="02020603050405020304" pitchFamily="18" charset="0"/>
+              </a:rPr>
+              <a:t>QR </a:t>
+            </a:r>
+            <a:r>
+              <a:rPr lang="pt-BR" sz="2000" dirty="0" err="1">
+                <a:latin typeface="Times New Roman" panose="02020603050405020304" pitchFamily="18" charset="0"/>
+                <a:cs typeface="Times New Roman" panose="02020603050405020304" pitchFamily="18" charset="0"/>
+              </a:rPr>
+              <a:t>Code</a:t>
+            </a:r>
+            <a:r>
+              <a:rPr lang="pt-BR" sz="2000" dirty="0">
+                <a:latin typeface="Times New Roman" panose="02020603050405020304" pitchFamily="18" charset="0"/>
+                <a:cs typeface="Times New Roman" panose="02020603050405020304" pitchFamily="18" charset="0"/>
+              </a:rPr>
+              <a:t> (Quick Response </a:t>
+            </a:r>
+            <a:r>
+              <a:rPr lang="pt-BR" sz="2000" dirty="0" err="1">
+                <a:latin typeface="Times New Roman" panose="02020603050405020304" pitchFamily="18" charset="0"/>
+                <a:cs typeface="Times New Roman" panose="02020603050405020304" pitchFamily="18" charset="0"/>
+              </a:rPr>
+              <a:t>Code</a:t>
+            </a:r>
+            <a:r>
+              <a:rPr lang="pt-BR" sz="2000" dirty="0">
+                <a:latin typeface="Times New Roman" panose="02020603050405020304" pitchFamily="18" charset="0"/>
+                <a:cs typeface="Times New Roman" panose="02020603050405020304" pitchFamily="18" charset="0"/>
+              </a:rPr>
+              <a:t>) .</a:t>
+            </a:r>
+          </a:p>
+          <a:p>
+            <a:pPr marL="0" indent="0" algn="just">
+              <a:buNone/>
+            </a:pPr>
+            <a:endParaRPr lang="pt-BR" sz="2000" dirty="0">
               <a:latin typeface="Times New Roman" panose="02020603050405020304" pitchFamily="18" charset="0"/>
               <a:cs typeface="Times New Roman" panose="02020603050405020304" pitchFamily="18" charset="0"/>
             </a:endParaRPr>
@@ -9563,7 +9817,19 @@
             <a:pPr marL="0" indent="0" algn="just">
               <a:buNone/>
             </a:pPr>
-            <a:endParaRPr lang="pt-BR" sz="2400" dirty="0">
+            <a:r>
+              <a:rPr lang="en-US" sz="2000" b="1" dirty="0">
+                <a:latin typeface="Times New Roman" panose="02020603050405020304" pitchFamily="18" charset="0"/>
+                <a:cs typeface="Times New Roman" panose="02020603050405020304" pitchFamily="18" charset="0"/>
+              </a:rPr>
+              <a:t>20 Beginner Python Projects</a:t>
+            </a:r>
+          </a:p>
+          <a:p>
+            <a:pPr marL="0" indent="0" algn="just">
+              <a:buNone/>
+            </a:pPr>
+            <a:endParaRPr lang="en-US" sz="2000" dirty="0">
               <a:latin typeface="Times New Roman" panose="02020603050405020304" pitchFamily="18" charset="0"/>
               <a:cs typeface="Times New Roman" panose="02020603050405020304" pitchFamily="18" charset="0"/>
             </a:endParaRPr>
@@ -9573,46 +9839,46 @@
               <a:buNone/>
             </a:pPr>
             <a:r>
-              <a:rPr lang="pt-BR" sz="2400" dirty="0">
-                <a:latin typeface="Times New Roman" panose="02020603050405020304" pitchFamily="18" charset="0"/>
-                <a:cs typeface="Times New Roman" panose="02020603050405020304" pitchFamily="18" charset="0"/>
-              </a:rPr>
-              <a:t>Em especial a rotina de QR </a:t>
-            </a:r>
-            <a:r>
-              <a:rPr lang="pt-BR" sz="2400" dirty="0" err="1">
-                <a:latin typeface="Times New Roman" panose="02020603050405020304" pitchFamily="18" charset="0"/>
-                <a:cs typeface="Times New Roman" panose="02020603050405020304" pitchFamily="18" charset="0"/>
-              </a:rPr>
-              <a:t>Code</a:t>
-            </a:r>
-            <a:r>
-              <a:rPr lang="pt-BR" sz="2400" dirty="0">
-                <a:latin typeface="Times New Roman" panose="02020603050405020304" pitchFamily="18" charset="0"/>
-                <a:cs typeface="Times New Roman" panose="02020603050405020304" pitchFamily="18" charset="0"/>
-              </a:rPr>
-              <a:t> (Quick Response </a:t>
-            </a:r>
-            <a:r>
-              <a:rPr lang="pt-BR" sz="2400" dirty="0" err="1">
-                <a:latin typeface="Times New Roman" panose="02020603050405020304" pitchFamily="18" charset="0"/>
-                <a:cs typeface="Times New Roman" panose="02020603050405020304" pitchFamily="18" charset="0"/>
-              </a:rPr>
-              <a:t>Code</a:t>
-            </a:r>
-            <a:r>
-              <a:rPr lang="pt-BR" sz="2400" dirty="0">
-                <a:latin typeface="Times New Roman" panose="02020603050405020304" pitchFamily="18" charset="0"/>
-                <a:cs typeface="Times New Roman" panose="02020603050405020304" pitchFamily="18" charset="0"/>
-              </a:rPr>
-              <a:t>) .</a:t>
+              <a:rPr lang="en-US" sz="2000" dirty="0">
+                <a:latin typeface="Times New Roman" panose="02020603050405020304" pitchFamily="18" charset="0"/>
+                <a:cs typeface="Times New Roman" panose="02020603050405020304" pitchFamily="18" charset="0"/>
+                <a:hlinkClick r:id="rId3"/>
+              </a:rPr>
+              <a:t>https://www.freecodecamp.org/news/20-beginner-python-projects/</a:t>
+            </a:r>
+            <a:r>
+              <a:rPr lang="en-US" sz="2000" dirty="0">
+                <a:latin typeface="Times New Roman" panose="02020603050405020304" pitchFamily="18" charset="0"/>
+                <a:cs typeface="Times New Roman" panose="02020603050405020304" pitchFamily="18" charset="0"/>
+              </a:rPr>
+              <a:t> </a:t>
             </a:r>
           </a:p>
           <a:p>
             <a:pPr marL="0" indent="0" algn="just">
               <a:buNone/>
             </a:pPr>
-            <a:endParaRPr lang="pt-BR" sz="2400" dirty="0">
+            <a:r>
+              <a:rPr lang="en-US" sz="2000" dirty="0">
+                <a:latin typeface="Times New Roman" panose="02020603050405020304" pitchFamily="18" charset="0"/>
+                <a:cs typeface="Times New Roman" panose="02020603050405020304" pitchFamily="18" charset="0"/>
+                <a:hlinkClick r:id="rId4"/>
+              </a:rPr>
+              <a:t>https://youtu.be/pdy3nh1tn6I</a:t>
+            </a:r>
+            <a:r>
+              <a:rPr lang="en-US" sz="2000" dirty="0">
+                <a:latin typeface="Times New Roman" panose="02020603050405020304" pitchFamily="18" charset="0"/>
+                <a:cs typeface="Times New Roman" panose="02020603050405020304" pitchFamily="18" charset="0"/>
+              </a:rPr>
+              <a:t> </a:t>
+            </a:r>
+          </a:p>
+          <a:p>
+            <a:pPr marL="0" indent="0" algn="just">
+              <a:buNone/>
+            </a:pPr>
+            <a:endParaRPr lang="en-US" sz="2000" dirty="0">
               <a:latin typeface="Times New Roman" panose="02020603050405020304" pitchFamily="18" charset="0"/>
               <a:cs typeface="Times New Roman" panose="02020603050405020304" pitchFamily="18" charset="0"/>
             </a:endParaRPr>
@@ -9622,26 +9888,11 @@
               <a:buNone/>
             </a:pPr>
             <a:r>
-              <a:rPr lang="pt-BR" sz="2400" dirty="0">
-                <a:latin typeface="Times New Roman" panose="02020603050405020304" pitchFamily="18" charset="0"/>
-                <a:cs typeface="Times New Roman" panose="02020603050405020304" pitchFamily="18" charset="0"/>
-              </a:rPr>
-              <a:t>			</a:t>
-            </a:r>
-            <a:r>
-              <a:rPr lang="pt-BR" sz="2400" dirty="0">
-                <a:latin typeface="Times New Roman" panose="02020603050405020304" pitchFamily="18" charset="0"/>
-                <a:cs typeface="Times New Roman" panose="02020603050405020304" pitchFamily="18" charset="0"/>
-                <a:hlinkClick r:id="rId3"/>
-              </a:rPr>
-              <a:t>https://www.freecodecamp.org/</a:t>
-            </a:r>
-            <a:r>
-              <a:rPr lang="pt-BR" sz="2400" dirty="0">
-                <a:latin typeface="Times New Roman" panose="02020603050405020304" pitchFamily="18" charset="0"/>
-                <a:cs typeface="Times New Roman" panose="02020603050405020304" pitchFamily="18" charset="0"/>
-              </a:rPr>
-              <a:t> </a:t>
+              <a:rPr lang="pt-BR" sz="2000" dirty="0">
+                <a:latin typeface="Times New Roman" panose="02020603050405020304" pitchFamily="18" charset="0"/>
+                <a:cs typeface="Times New Roman" panose="02020603050405020304" pitchFamily="18" charset="0"/>
+              </a:rPr>
+              <a:t>		</a:t>
             </a:r>
           </a:p>
         </p:txBody>
@@ -9695,6 +9946,447 @@
         </p:spPr>
         <p:txBody>
           <a:bodyPr>
+            <a:normAutofit fontScale="90000"/>
+          </a:bodyPr>
+          <a:lstStyle/>
+          <a:p>
+            <a:r>
+              <a:rPr lang="en-US" b="1" dirty="0" err="1">
+                <a:solidFill>
+                  <a:srgbClr val="0070C0"/>
+                </a:solidFill>
+              </a:rPr>
+              <a:t>Dinâmica</a:t>
+            </a:r>
+            <a:r>
+              <a:rPr lang="en-US" b="1" dirty="0">
+                <a:solidFill>
+                  <a:srgbClr val="0070C0"/>
+                </a:solidFill>
+              </a:rPr>
+              <a:t>/</a:t>
+            </a:r>
+            <a:r>
+              <a:rPr lang="en-US" b="1" dirty="0" err="1">
+                <a:solidFill>
+                  <a:srgbClr val="0070C0"/>
+                </a:solidFill>
+              </a:rPr>
+              <a:t>Atividades</a:t>
+            </a:r>
+            <a:r>
+              <a:rPr lang="en-US" b="1" dirty="0">
+                <a:solidFill>
+                  <a:srgbClr val="0070C0"/>
+                </a:solidFill>
+              </a:rPr>
+              <a:t> API Web Django</a:t>
+            </a:r>
+          </a:p>
+        </p:txBody>
+      </p:sp>
+      <p:sp>
+        <p:nvSpPr>
+          <p:cNvPr id="8" name="Text Placeholder 2"/>
+          <p:cNvSpPr>
+            <a:spLocks noGrp="1"/>
+          </p:cNvSpPr>
+          <p:nvPr>
+            <p:ph type="body" sz="half" idx="1"/>
+          </p:nvPr>
+        </p:nvSpPr>
+        <p:spPr>
+          <a:xfrm>
+            <a:off x="139472" y="1063230"/>
+            <a:ext cx="8865056" cy="3874290"/>
+          </a:xfrm>
+        </p:spPr>
+        <p:txBody>
+          <a:bodyPr>
+            <a:noAutofit/>
+          </a:bodyPr>
+          <a:lstStyle/>
+          <a:p>
+            <a:pPr marL="0" indent="0" algn="just">
+              <a:buNone/>
+            </a:pPr>
+            <a:r>
+              <a:rPr lang="en-US" sz="2000" b="1" dirty="0">
+                <a:latin typeface="Times New Roman" panose="02020603050405020304" pitchFamily="18" charset="0"/>
+                <a:cs typeface="Times New Roman" panose="02020603050405020304" pitchFamily="18" charset="0"/>
+              </a:rPr>
+              <a:t>How To Build A Realtime Chat App With Django</a:t>
+            </a:r>
+          </a:p>
+          <a:p>
+            <a:pPr marL="0" indent="0" algn="just">
+              <a:buNone/>
+            </a:pPr>
+            <a:r>
+              <a:rPr lang="en-US" sz="2000" dirty="0">
+                <a:latin typeface="Times New Roman" panose="02020603050405020304" pitchFamily="18" charset="0"/>
+                <a:cs typeface="Times New Roman" panose="02020603050405020304" pitchFamily="18" charset="0"/>
+                <a:hlinkClick r:id="rId3"/>
+              </a:rPr>
+              <a:t>https://www.youtube.com/c/CodeWithTomi</a:t>
+            </a:r>
+            <a:r>
+              <a:rPr lang="en-US" sz="2000" dirty="0">
+                <a:latin typeface="Times New Roman" panose="02020603050405020304" pitchFamily="18" charset="0"/>
+                <a:cs typeface="Times New Roman" panose="02020603050405020304" pitchFamily="18" charset="0"/>
+              </a:rPr>
+              <a:t> </a:t>
+            </a:r>
+          </a:p>
+          <a:p>
+            <a:pPr marL="0" indent="0" algn="just">
+              <a:buNone/>
+            </a:pPr>
+            <a:endParaRPr lang="en-US" sz="2000" dirty="0">
+              <a:latin typeface="Times New Roman" panose="02020603050405020304" pitchFamily="18" charset="0"/>
+              <a:cs typeface="Times New Roman" panose="02020603050405020304" pitchFamily="18" charset="0"/>
+            </a:endParaRPr>
+          </a:p>
+          <a:p>
+            <a:pPr marL="0" indent="0" algn="just">
+              <a:buNone/>
+            </a:pPr>
+            <a:r>
+              <a:rPr lang="en-US" sz="2000" b="1" dirty="0">
+                <a:latin typeface="Times New Roman" panose="02020603050405020304" pitchFamily="18" charset="0"/>
+                <a:cs typeface="Times New Roman" panose="02020603050405020304" pitchFamily="18" charset="0"/>
+              </a:rPr>
+              <a:t>Backend Web Development Full Course</a:t>
+            </a:r>
+          </a:p>
+          <a:p>
+            <a:pPr marL="0" indent="0" algn="just">
+              <a:buNone/>
+            </a:pPr>
+            <a:r>
+              <a:rPr lang="en-US" sz="2000" dirty="0">
+                <a:latin typeface="Times New Roman" panose="02020603050405020304" pitchFamily="18" charset="0"/>
+                <a:cs typeface="Times New Roman" panose="02020603050405020304" pitchFamily="18" charset="0"/>
+                <a:hlinkClick r:id="rId4"/>
+              </a:rPr>
+              <a:t>https://www.freecodecamp.org/news/backend-web-development-with-python-full-course/</a:t>
+            </a:r>
+            <a:r>
+              <a:rPr lang="en-US" sz="2000" dirty="0">
+                <a:latin typeface="Times New Roman" panose="02020603050405020304" pitchFamily="18" charset="0"/>
+                <a:cs typeface="Times New Roman" panose="02020603050405020304" pitchFamily="18" charset="0"/>
+              </a:rPr>
+              <a:t> </a:t>
+            </a:r>
+          </a:p>
+          <a:p>
+            <a:pPr marL="0" indent="0" algn="just">
+              <a:buNone/>
+            </a:pPr>
+            <a:r>
+              <a:rPr lang="en-US" sz="2000" dirty="0">
+                <a:latin typeface="Times New Roman" panose="02020603050405020304" pitchFamily="18" charset="0"/>
+                <a:cs typeface="Times New Roman" panose="02020603050405020304" pitchFamily="18" charset="0"/>
+                <a:hlinkClick r:id="rId5"/>
+              </a:rPr>
+              <a:t>https://youtu.be/jBzwzrDvZ18</a:t>
+            </a:r>
+            <a:r>
+              <a:rPr lang="en-US" sz="2000" dirty="0">
+                <a:latin typeface="Times New Roman" panose="02020603050405020304" pitchFamily="18" charset="0"/>
+                <a:cs typeface="Times New Roman" panose="02020603050405020304" pitchFamily="18" charset="0"/>
+              </a:rPr>
+              <a:t> </a:t>
+            </a:r>
+          </a:p>
+          <a:p>
+            <a:pPr marL="0" indent="0" algn="just">
+              <a:buNone/>
+            </a:pPr>
+            <a:endParaRPr lang="en-US" sz="2000" dirty="0">
+              <a:latin typeface="Times New Roman" panose="02020603050405020304" pitchFamily="18" charset="0"/>
+              <a:cs typeface="Times New Roman" panose="02020603050405020304" pitchFamily="18" charset="0"/>
+            </a:endParaRPr>
+          </a:p>
+          <a:p>
+            <a:pPr marL="0" indent="0" algn="just">
+              <a:buNone/>
+            </a:pPr>
+            <a:r>
+              <a:rPr lang="en-US" sz="2000" b="1" dirty="0">
+                <a:latin typeface="Times New Roman" panose="02020603050405020304" pitchFamily="18" charset="0"/>
+                <a:cs typeface="Times New Roman" panose="02020603050405020304" pitchFamily="18" charset="0"/>
+              </a:rPr>
+              <a:t>How to Use Python for Web Development</a:t>
+            </a:r>
+          </a:p>
+          <a:p>
+            <a:pPr marL="0" indent="0" algn="just">
+              <a:buNone/>
+            </a:pPr>
+            <a:r>
+              <a:rPr lang="en-US" sz="2000" dirty="0">
+                <a:latin typeface="Times New Roman" panose="02020603050405020304" pitchFamily="18" charset="0"/>
+                <a:cs typeface="Times New Roman" panose="02020603050405020304" pitchFamily="18" charset="0"/>
+                <a:hlinkClick r:id="rId6"/>
+              </a:rPr>
+              <a:t>https://youtu.be/WNvxR8RFzBg</a:t>
+            </a:r>
+            <a:r>
+              <a:rPr lang="en-US" sz="2000" dirty="0">
+                <a:latin typeface="Times New Roman" panose="02020603050405020304" pitchFamily="18" charset="0"/>
+                <a:cs typeface="Times New Roman" panose="02020603050405020304" pitchFamily="18" charset="0"/>
+              </a:rPr>
+              <a:t> </a:t>
+            </a:r>
+            <a:r>
+              <a:rPr lang="pt-BR" sz="2000" dirty="0">
+                <a:latin typeface="Times New Roman" panose="02020603050405020304" pitchFamily="18" charset="0"/>
+                <a:cs typeface="Times New Roman" panose="02020603050405020304" pitchFamily="18" charset="0"/>
+              </a:rPr>
+              <a:t>		</a:t>
+            </a:r>
+          </a:p>
+        </p:txBody>
+      </p:sp>
+    </p:spTree>
+    <p:extLst>
+      <p:ext uri="{BB962C8B-B14F-4D97-AF65-F5344CB8AC3E}">
+        <p14:creationId xmlns:p14="http://schemas.microsoft.com/office/powerpoint/2010/main" val="1492588598"/>
+      </p:ext>
+    </p:extLst>
+  </p:cSld>
+  <p:clrMapOvr>
+    <a:masterClrMapping/>
+  </p:clrMapOvr>
+  <p:transition spd="med"/>
+</p:sld>
+</file>
+
+<file path=ppt/slides/slide28.xml><?xml version="1.0" encoding="utf-8"?>
+<p:sld xmlns:a="http://schemas.openxmlformats.org/drawingml/2006/main" xmlns:r="http://schemas.openxmlformats.org/officeDocument/2006/relationships" xmlns:p="http://schemas.openxmlformats.org/presentationml/2006/main">
+  <p:cSld>
+    <p:spTree>
+      <p:nvGrpSpPr>
+        <p:cNvPr id="1" name=""/>
+        <p:cNvGrpSpPr/>
+        <p:nvPr/>
+      </p:nvGrpSpPr>
+      <p:grpSpPr>
+        <a:xfrm>
+          <a:off x="0" y="0"/>
+          <a:ext cx="0" cy="0"/>
+          <a:chOff x="0" y="0"/>
+          <a:chExt cx="0" cy="0"/>
+        </a:xfrm>
+      </p:grpSpPr>
+      <p:sp>
+        <p:nvSpPr>
+          <p:cNvPr id="6" name="Title 1"/>
+          <p:cNvSpPr>
+            <a:spLocks noGrp="1"/>
+          </p:cNvSpPr>
+          <p:nvPr>
+            <p:ph type="title"/>
+          </p:nvPr>
+        </p:nvSpPr>
+        <p:spPr>
+          <a:xfrm>
+            <a:off x="457200" y="205980"/>
+            <a:ext cx="8229600" cy="857251"/>
+          </a:xfrm>
+        </p:spPr>
+        <p:txBody>
+          <a:bodyPr>
+            <a:normAutofit/>
+          </a:bodyPr>
+          <a:lstStyle/>
+          <a:p>
+            <a:r>
+              <a:rPr lang="en-US" b="1" dirty="0" err="1">
+                <a:solidFill>
+                  <a:srgbClr val="0070C0"/>
+                </a:solidFill>
+              </a:rPr>
+              <a:t>Dinâmica</a:t>
+            </a:r>
+            <a:r>
+              <a:rPr lang="en-US" b="1" dirty="0">
+                <a:solidFill>
+                  <a:srgbClr val="0070C0"/>
+                </a:solidFill>
+              </a:rPr>
+              <a:t>/</a:t>
+            </a:r>
+            <a:r>
+              <a:rPr lang="en-US" b="1" dirty="0" err="1">
+                <a:solidFill>
+                  <a:srgbClr val="0070C0"/>
+                </a:solidFill>
+              </a:rPr>
+              <a:t>Atividades</a:t>
+            </a:r>
+            <a:endParaRPr lang="en-US" b="1" dirty="0">
+              <a:solidFill>
+                <a:srgbClr val="0070C0"/>
+              </a:solidFill>
+            </a:endParaRPr>
+          </a:p>
+        </p:txBody>
+      </p:sp>
+      <p:sp>
+        <p:nvSpPr>
+          <p:cNvPr id="8" name="Text Placeholder 2"/>
+          <p:cNvSpPr>
+            <a:spLocks noGrp="1"/>
+          </p:cNvSpPr>
+          <p:nvPr>
+            <p:ph type="body" sz="half" idx="1"/>
+          </p:nvPr>
+        </p:nvSpPr>
+        <p:spPr>
+          <a:xfrm>
+            <a:off x="139472" y="1063230"/>
+            <a:ext cx="8865056" cy="3606305"/>
+          </a:xfrm>
+        </p:spPr>
+        <p:txBody>
+          <a:bodyPr>
+            <a:noAutofit/>
+          </a:bodyPr>
+          <a:lstStyle/>
+          <a:p>
+            <a:pPr marL="0" indent="0" algn="just">
+              <a:buNone/>
+            </a:pPr>
+            <a:r>
+              <a:rPr lang="pt-BR" sz="2000" b="1" dirty="0">
+                <a:latin typeface="Times New Roman" panose="02020603050405020304" pitchFamily="18" charset="0"/>
+                <a:cs typeface="Times New Roman" panose="02020603050405020304" pitchFamily="18" charset="0"/>
+              </a:rPr>
+              <a:t>Praticar</a:t>
+            </a:r>
+            <a:r>
+              <a:rPr lang="pt-BR" sz="2000" dirty="0">
+                <a:latin typeface="Times New Roman" panose="02020603050405020304" pitchFamily="18" charset="0"/>
+                <a:cs typeface="Times New Roman" panose="02020603050405020304" pitchFamily="18" charset="0"/>
+              </a:rPr>
+              <a:t> – Soluções </a:t>
+            </a:r>
+            <a:r>
+              <a:rPr lang="pt-BR" sz="2000" b="1" dirty="0" err="1">
+                <a:latin typeface="Times New Roman" panose="02020603050405020304" pitchFamily="18" charset="0"/>
+                <a:cs typeface="Times New Roman" panose="02020603050405020304" pitchFamily="18" charset="0"/>
+              </a:rPr>
+              <a:t>Freecodecamp</a:t>
+            </a:r>
+            <a:r>
+              <a:rPr lang="pt-BR" sz="2000" b="1" dirty="0">
+                <a:solidFill>
+                  <a:srgbClr val="FF0000"/>
+                </a:solidFill>
+                <a:latin typeface="Times New Roman" panose="02020603050405020304" pitchFamily="18" charset="0"/>
+                <a:cs typeface="Times New Roman" panose="02020603050405020304" pitchFamily="18" charset="0"/>
+              </a:rPr>
+              <a:t> (Livre)</a:t>
+            </a:r>
+          </a:p>
+          <a:p>
+            <a:pPr marL="0" indent="0" algn="just">
+              <a:buNone/>
+            </a:pPr>
+            <a:endParaRPr lang="pt-BR" sz="2000" dirty="0">
+              <a:latin typeface="Times New Roman" panose="02020603050405020304" pitchFamily="18" charset="0"/>
+              <a:cs typeface="Times New Roman" panose="02020603050405020304" pitchFamily="18" charset="0"/>
+            </a:endParaRPr>
+          </a:p>
+          <a:p>
+            <a:pPr marL="0" indent="0" algn="just">
+              <a:buNone/>
+            </a:pPr>
+            <a:endParaRPr lang="pt-BR" sz="2000" dirty="0">
+              <a:latin typeface="Times New Roman" panose="02020603050405020304" pitchFamily="18" charset="0"/>
+              <a:cs typeface="Times New Roman" panose="02020603050405020304" pitchFamily="18" charset="0"/>
+            </a:endParaRPr>
+          </a:p>
+          <a:p>
+            <a:pPr marL="0" indent="0" algn="just">
+              <a:buNone/>
+            </a:pPr>
+            <a:r>
+              <a:rPr lang="pt-BR" sz="2000" dirty="0">
+                <a:latin typeface="Times New Roman" panose="02020603050405020304" pitchFamily="18" charset="0"/>
+                <a:cs typeface="Times New Roman" panose="02020603050405020304" pitchFamily="18" charset="0"/>
+              </a:rPr>
+              <a:t>			</a:t>
+            </a:r>
+            <a:r>
+              <a:rPr lang="pt-BR" sz="2000" dirty="0">
+                <a:latin typeface="Times New Roman" panose="02020603050405020304" pitchFamily="18" charset="0"/>
+                <a:cs typeface="Times New Roman" panose="02020603050405020304" pitchFamily="18" charset="0"/>
+                <a:hlinkClick r:id="rId3"/>
+              </a:rPr>
+              <a:t>https://www.freecodecamp.org/</a:t>
+            </a:r>
+            <a:r>
+              <a:rPr lang="pt-BR" sz="2000" dirty="0">
+                <a:latin typeface="Times New Roman" panose="02020603050405020304" pitchFamily="18" charset="0"/>
+                <a:cs typeface="Times New Roman" panose="02020603050405020304" pitchFamily="18" charset="0"/>
+              </a:rPr>
+              <a:t> </a:t>
+            </a:r>
+          </a:p>
+        </p:txBody>
+      </p:sp>
+    </p:spTree>
+    <p:extLst>
+      <p:ext uri="{BB962C8B-B14F-4D97-AF65-F5344CB8AC3E}">
+        <p14:creationId xmlns:p14="http://schemas.microsoft.com/office/powerpoint/2010/main" val="4129830393"/>
+      </p:ext>
+    </p:extLst>
+  </p:cSld>
+  <p:clrMapOvr>
+    <a:masterClrMapping/>
+  </p:clrMapOvr>
+  <p:transition spd="med"/>
+</p:sld>
+</file>
+
+<file path=ppt/slides/slide29.xml><?xml version="1.0" encoding="utf-8"?>
+<p:sld xmlns:a="http://schemas.openxmlformats.org/drawingml/2006/main" xmlns:r="http://schemas.openxmlformats.org/officeDocument/2006/relationships" xmlns:p="http://schemas.openxmlformats.org/presentationml/2006/main">
+  <p:cSld>
+    <p:spTree>
+      <p:nvGrpSpPr>
+        <p:cNvPr id="1" name=""/>
+        <p:cNvGrpSpPr/>
+        <p:nvPr/>
+      </p:nvGrpSpPr>
+      <p:grpSpPr>
+        <a:xfrm>
+          <a:off x="0" y="0"/>
+          <a:ext cx="0" cy="0"/>
+          <a:chOff x="0" y="0"/>
+          <a:chExt cx="0" cy="0"/>
+        </a:xfrm>
+      </p:grpSpPr>
+      <p:sp>
+        <p:nvSpPr>
+          <p:cNvPr id="6" name="Title 1"/>
+          <p:cNvSpPr>
+            <a:spLocks noGrp="1"/>
+          </p:cNvSpPr>
+          <p:nvPr>
+            <p:ph type="title"/>
+          </p:nvPr>
+        </p:nvSpPr>
+        <p:spPr>
+          <a:xfrm>
+            <a:off x="457200" y="205980"/>
+            <a:ext cx="8229600" cy="857251"/>
+          </a:xfrm>
+        </p:spPr>
+        <p:txBody>
+          <a:bodyPr>
             <a:normAutofit/>
           </a:bodyPr>
           <a:lstStyle/>
@@ -9886,7 +10578,250 @@
 </p:sld>
 </file>
 
-<file path=ppt/slides/slide28.xml><?xml version="1.0" encoding="utf-8"?>
+<file path=ppt/slides/slide3.xml><?xml version="1.0" encoding="utf-8"?>
+<p:sld xmlns:a="http://schemas.openxmlformats.org/drawingml/2006/main" xmlns:r="http://schemas.openxmlformats.org/officeDocument/2006/relationships" xmlns:p="http://schemas.openxmlformats.org/presentationml/2006/main">
+  <p:cSld>
+    <p:spTree>
+      <p:nvGrpSpPr>
+        <p:cNvPr id="1" name=""/>
+        <p:cNvGrpSpPr/>
+        <p:nvPr/>
+      </p:nvGrpSpPr>
+      <p:grpSpPr>
+        <a:xfrm>
+          <a:off x="0" y="0"/>
+          <a:ext cx="0" cy="0"/>
+          <a:chOff x="0" y="0"/>
+          <a:chExt cx="0" cy="0"/>
+        </a:xfrm>
+      </p:grpSpPr>
+      <p:sp>
+        <p:nvSpPr>
+          <p:cNvPr id="6" name="Title 1"/>
+          <p:cNvSpPr>
+            <a:spLocks noGrp="1"/>
+          </p:cNvSpPr>
+          <p:nvPr>
+            <p:ph type="title"/>
+          </p:nvPr>
+        </p:nvSpPr>
+        <p:spPr>
+          <a:xfrm>
+            <a:off x="457200" y="205980"/>
+            <a:ext cx="8229600" cy="857251"/>
+          </a:xfrm>
+        </p:spPr>
+        <p:txBody>
+          <a:bodyPr>
+            <a:normAutofit/>
+          </a:bodyPr>
+          <a:lstStyle/>
+          <a:p>
+            <a:r>
+              <a:rPr lang="pt-BR" b="1" dirty="0">
+                <a:solidFill>
+                  <a:srgbClr val="0070C0"/>
+                </a:solidFill>
+              </a:rPr>
+              <a:t>Indústria 4.0</a:t>
+            </a:r>
+            <a:endParaRPr lang="en-US" b="1" dirty="0">
+              <a:solidFill>
+                <a:srgbClr val="0070C0"/>
+              </a:solidFill>
+            </a:endParaRPr>
+          </a:p>
+        </p:txBody>
+      </p:sp>
+      <p:sp>
+        <p:nvSpPr>
+          <p:cNvPr id="8" name="Text Placeholder 2"/>
+          <p:cNvSpPr>
+            <a:spLocks noGrp="1"/>
+          </p:cNvSpPr>
+          <p:nvPr>
+            <p:ph type="body" sz="half" idx="1"/>
+          </p:nvPr>
+        </p:nvSpPr>
+        <p:spPr>
+          <a:xfrm>
+            <a:off x="142865" y="1200150"/>
+            <a:ext cx="8865056" cy="3737370"/>
+          </a:xfrm>
+        </p:spPr>
+        <p:txBody>
+          <a:bodyPr>
+            <a:noAutofit/>
+          </a:bodyPr>
+          <a:lstStyle/>
+          <a:p>
+            <a:pPr marL="0" indent="0" algn="just">
+              <a:buNone/>
+            </a:pPr>
+            <a:r>
+              <a:rPr lang="pt-BR" sz="2400" dirty="0">
+                <a:solidFill>
+                  <a:srgbClr val="3B3934"/>
+                </a:solidFill>
+                <a:latin typeface="Times New Roman" panose="02020603050405020304" pitchFamily="18" charset="0"/>
+                <a:cs typeface="Times New Roman" panose="02020603050405020304" pitchFamily="18" charset="0"/>
+              </a:rPr>
+              <a:t>O </a:t>
+            </a:r>
+            <a:r>
+              <a:rPr lang="pt-BR" sz="2400" b="1" i="0" dirty="0">
+                <a:solidFill>
+                  <a:srgbClr val="3B3934"/>
+                </a:solidFill>
+                <a:effectLst/>
+                <a:latin typeface="Times New Roman" panose="02020603050405020304" pitchFamily="18" charset="0"/>
+                <a:cs typeface="Times New Roman" panose="02020603050405020304" pitchFamily="18" charset="0"/>
+              </a:rPr>
+              <a:t>principal objetivo</a:t>
+            </a:r>
+            <a:r>
+              <a:rPr lang="pt-BR" sz="2400" b="0" i="0" dirty="0">
+                <a:solidFill>
+                  <a:srgbClr val="3B3934"/>
+                </a:solidFill>
+                <a:effectLst/>
+                <a:latin typeface="Times New Roman" panose="02020603050405020304" pitchFamily="18" charset="0"/>
+                <a:cs typeface="Times New Roman" panose="02020603050405020304" pitchFamily="18" charset="0"/>
+              </a:rPr>
+              <a:t> é:</a:t>
+            </a:r>
+          </a:p>
+          <a:p>
+            <a:pPr marL="0" indent="0" algn="just">
+              <a:buNone/>
+            </a:pPr>
+            <a:endParaRPr lang="pt-BR" sz="2400" dirty="0">
+              <a:solidFill>
+                <a:srgbClr val="3B3934"/>
+              </a:solidFill>
+              <a:latin typeface="Times New Roman" panose="02020603050405020304" pitchFamily="18" charset="0"/>
+              <a:cs typeface="Times New Roman" panose="02020603050405020304" pitchFamily="18" charset="0"/>
+            </a:endParaRPr>
+          </a:p>
+          <a:p>
+            <a:pPr marL="0" indent="0" algn="just">
+              <a:buNone/>
+            </a:pPr>
+            <a:endParaRPr lang="pt-BR" sz="2400" b="0" i="0" dirty="0">
+              <a:solidFill>
+                <a:srgbClr val="3B3934"/>
+              </a:solidFill>
+              <a:effectLst/>
+              <a:latin typeface="Times New Roman" panose="02020603050405020304" pitchFamily="18" charset="0"/>
+              <a:cs typeface="Times New Roman" panose="02020603050405020304" pitchFamily="18" charset="0"/>
+            </a:endParaRPr>
+          </a:p>
+          <a:p>
+            <a:pPr marL="0" indent="0" algn="just">
+              <a:buNone/>
+            </a:pPr>
+            <a:r>
+              <a:rPr lang="pt-BR" sz="2400" b="0" i="0" dirty="0">
+                <a:solidFill>
+                  <a:srgbClr val="3B3934"/>
+                </a:solidFill>
+                <a:effectLst/>
+                <a:latin typeface="Times New Roman" panose="02020603050405020304" pitchFamily="18" charset="0"/>
+                <a:cs typeface="Times New Roman" panose="02020603050405020304" pitchFamily="18" charset="0"/>
+              </a:rPr>
+              <a:t>Tornar a </a:t>
+            </a:r>
+            <a:r>
+              <a:rPr lang="pt-BR" sz="2400" b="1" i="0" dirty="0">
+                <a:solidFill>
+                  <a:srgbClr val="3B3934"/>
+                </a:solidFill>
+                <a:effectLst/>
+                <a:latin typeface="Times New Roman" panose="02020603050405020304" pitchFamily="18" charset="0"/>
+                <a:cs typeface="Times New Roman" panose="02020603050405020304" pitchFamily="18" charset="0"/>
+              </a:rPr>
+              <a:t>manufatura</a:t>
+            </a:r>
+            <a:r>
+              <a:rPr lang="pt-BR" sz="2400" b="0" i="0" dirty="0">
+                <a:solidFill>
+                  <a:srgbClr val="3B3934"/>
+                </a:solidFill>
+                <a:effectLst/>
+                <a:latin typeface="Times New Roman" panose="02020603050405020304" pitchFamily="18" charset="0"/>
+                <a:cs typeface="Times New Roman" panose="02020603050405020304" pitchFamily="18" charset="0"/>
+              </a:rPr>
+              <a:t> mais </a:t>
+            </a:r>
+            <a:r>
+              <a:rPr lang="pt-BR" sz="2400" b="1" i="0" dirty="0">
+                <a:solidFill>
+                  <a:srgbClr val="FF0000"/>
+                </a:solidFill>
+                <a:effectLst/>
+                <a:latin typeface="Times New Roman" panose="02020603050405020304" pitchFamily="18" charset="0"/>
+                <a:cs typeface="Times New Roman" panose="02020603050405020304" pitchFamily="18" charset="0"/>
+              </a:rPr>
+              <a:t>rápida, eficiente e inteligente</a:t>
+            </a:r>
+            <a:r>
+              <a:rPr lang="pt-BR" sz="2400" b="0" i="0" dirty="0">
+                <a:solidFill>
+                  <a:srgbClr val="3B3934"/>
+                </a:solidFill>
+                <a:effectLst/>
+                <a:latin typeface="Times New Roman" panose="02020603050405020304" pitchFamily="18" charset="0"/>
+                <a:cs typeface="Times New Roman" panose="02020603050405020304" pitchFamily="18" charset="0"/>
+              </a:rPr>
+              <a:t>, por meio das </a:t>
+            </a:r>
+            <a:r>
+              <a:rPr lang="pt-BR" sz="2400" b="1" i="0" dirty="0">
+                <a:solidFill>
+                  <a:srgbClr val="3B3934"/>
+                </a:solidFill>
+                <a:effectLst/>
+                <a:latin typeface="Times New Roman" panose="02020603050405020304" pitchFamily="18" charset="0"/>
+                <a:cs typeface="Times New Roman" panose="02020603050405020304" pitchFamily="18" charset="0"/>
+              </a:rPr>
+              <a:t>tecnologias da informação</a:t>
+            </a:r>
+            <a:r>
+              <a:rPr lang="pt-BR" sz="2400" b="0" i="0" dirty="0">
+                <a:solidFill>
+                  <a:srgbClr val="3B3934"/>
+                </a:solidFill>
+                <a:effectLst/>
+                <a:latin typeface="Times New Roman" panose="02020603050405020304" pitchFamily="18" charset="0"/>
+                <a:cs typeface="Times New Roman" panose="02020603050405020304" pitchFamily="18" charset="0"/>
+              </a:rPr>
+              <a:t>.</a:t>
+            </a:r>
+            <a:endParaRPr lang="pt-BR" sz="2400" dirty="0">
+              <a:solidFill>
+                <a:schemeClr val="tx1"/>
+              </a:solidFill>
+              <a:latin typeface="Times New Roman" panose="02020603050405020304" pitchFamily="18" charset="0"/>
+              <a:cs typeface="Times New Roman" panose="02020603050405020304" pitchFamily="18" charset="0"/>
+            </a:endParaRPr>
+          </a:p>
+        </p:txBody>
+      </p:sp>
+    </p:spTree>
+    <p:extLst>
+      <p:ext uri="{BB962C8B-B14F-4D97-AF65-F5344CB8AC3E}">
+        <p14:creationId xmlns:p14="http://schemas.microsoft.com/office/powerpoint/2010/main" val="3244679594"/>
+      </p:ext>
+    </p:extLst>
+  </p:cSld>
+  <p:clrMapOvr>
+    <a:masterClrMapping/>
+  </p:clrMapOvr>
+  <p:transition spd="med"/>
+</p:sld>
+</file>
+
+<file path=ppt/slides/slide30.xml><?xml version="1.0" encoding="utf-8"?>
 <p:sld xmlns:a="http://schemas.openxmlformats.org/drawingml/2006/main" xmlns:r="http://schemas.openxmlformats.org/officeDocument/2006/relationships" xmlns:p="http://schemas.openxmlformats.org/presentationml/2006/main">
   <p:cSld>
     <p:spTree>
@@ -10333,249 +11268,6 @@
         </p:spPr>
       </p:pic>
     </p:spTree>
-  </p:cSld>
-  <p:clrMapOvr>
-    <a:masterClrMapping/>
-  </p:clrMapOvr>
-  <p:transition spd="med"/>
-</p:sld>
-</file>
-
-<file path=ppt/slides/slide3.xml><?xml version="1.0" encoding="utf-8"?>
-<p:sld xmlns:a="http://schemas.openxmlformats.org/drawingml/2006/main" xmlns:r="http://schemas.openxmlformats.org/officeDocument/2006/relationships" xmlns:p="http://schemas.openxmlformats.org/presentationml/2006/main">
-  <p:cSld>
-    <p:spTree>
-      <p:nvGrpSpPr>
-        <p:cNvPr id="1" name=""/>
-        <p:cNvGrpSpPr/>
-        <p:nvPr/>
-      </p:nvGrpSpPr>
-      <p:grpSpPr>
-        <a:xfrm>
-          <a:off x="0" y="0"/>
-          <a:ext cx="0" cy="0"/>
-          <a:chOff x="0" y="0"/>
-          <a:chExt cx="0" cy="0"/>
-        </a:xfrm>
-      </p:grpSpPr>
-      <p:sp>
-        <p:nvSpPr>
-          <p:cNvPr id="6" name="Title 1"/>
-          <p:cNvSpPr>
-            <a:spLocks noGrp="1"/>
-          </p:cNvSpPr>
-          <p:nvPr>
-            <p:ph type="title"/>
-          </p:nvPr>
-        </p:nvSpPr>
-        <p:spPr>
-          <a:xfrm>
-            <a:off x="457200" y="205980"/>
-            <a:ext cx="8229600" cy="857251"/>
-          </a:xfrm>
-        </p:spPr>
-        <p:txBody>
-          <a:bodyPr>
-            <a:normAutofit/>
-          </a:bodyPr>
-          <a:lstStyle/>
-          <a:p>
-            <a:r>
-              <a:rPr lang="pt-BR" b="1" dirty="0">
-                <a:solidFill>
-                  <a:srgbClr val="0070C0"/>
-                </a:solidFill>
-              </a:rPr>
-              <a:t>Indústria 4.0</a:t>
-            </a:r>
-            <a:endParaRPr lang="en-US" b="1" dirty="0">
-              <a:solidFill>
-                <a:srgbClr val="0070C0"/>
-              </a:solidFill>
-            </a:endParaRPr>
-          </a:p>
-        </p:txBody>
-      </p:sp>
-      <p:sp>
-        <p:nvSpPr>
-          <p:cNvPr id="8" name="Text Placeholder 2"/>
-          <p:cNvSpPr>
-            <a:spLocks noGrp="1"/>
-          </p:cNvSpPr>
-          <p:nvPr>
-            <p:ph type="body" sz="half" idx="1"/>
-          </p:nvPr>
-        </p:nvSpPr>
-        <p:spPr>
-          <a:xfrm>
-            <a:off x="142865" y="1200150"/>
-            <a:ext cx="8865056" cy="3737370"/>
-          </a:xfrm>
-        </p:spPr>
-        <p:txBody>
-          <a:bodyPr>
-            <a:noAutofit/>
-          </a:bodyPr>
-          <a:lstStyle/>
-          <a:p>
-            <a:pPr marL="0" indent="0" algn="just">
-              <a:buNone/>
-            </a:pPr>
-            <a:r>
-              <a:rPr lang="pt-BR" sz="2400" dirty="0">
-                <a:solidFill>
-                  <a:srgbClr val="3B3934"/>
-                </a:solidFill>
-                <a:latin typeface="Times New Roman" panose="02020603050405020304" pitchFamily="18" charset="0"/>
-                <a:cs typeface="Times New Roman" panose="02020603050405020304" pitchFamily="18" charset="0"/>
-              </a:rPr>
-              <a:t>O </a:t>
-            </a:r>
-            <a:r>
-              <a:rPr lang="pt-BR" sz="2400" b="1" i="0" dirty="0">
-                <a:solidFill>
-                  <a:srgbClr val="3B3934"/>
-                </a:solidFill>
-                <a:effectLst/>
-                <a:latin typeface="Times New Roman" panose="02020603050405020304" pitchFamily="18" charset="0"/>
-                <a:cs typeface="Times New Roman" panose="02020603050405020304" pitchFamily="18" charset="0"/>
-              </a:rPr>
-              <a:t>principal objetivo</a:t>
-            </a:r>
-            <a:r>
-              <a:rPr lang="pt-BR" sz="2400" b="0" i="0" dirty="0">
-                <a:solidFill>
-                  <a:srgbClr val="3B3934"/>
-                </a:solidFill>
-                <a:effectLst/>
-                <a:latin typeface="Times New Roman" panose="02020603050405020304" pitchFamily="18" charset="0"/>
-                <a:cs typeface="Times New Roman" panose="02020603050405020304" pitchFamily="18" charset="0"/>
-              </a:rPr>
-              <a:t> é:</a:t>
-            </a:r>
-          </a:p>
-          <a:p>
-            <a:pPr marL="0" indent="0" algn="just">
-              <a:buNone/>
-            </a:pPr>
-            <a:endParaRPr lang="pt-BR" sz="2400" dirty="0">
-              <a:solidFill>
-                <a:srgbClr val="3B3934"/>
-              </a:solidFill>
-              <a:latin typeface="Times New Roman" panose="02020603050405020304" pitchFamily="18" charset="0"/>
-              <a:cs typeface="Times New Roman" panose="02020603050405020304" pitchFamily="18" charset="0"/>
-            </a:endParaRPr>
-          </a:p>
-          <a:p>
-            <a:pPr marL="0" indent="0" algn="just">
-              <a:buNone/>
-            </a:pPr>
-            <a:endParaRPr lang="pt-BR" sz="2400" b="0" i="0" dirty="0">
-              <a:solidFill>
-                <a:srgbClr val="3B3934"/>
-              </a:solidFill>
-              <a:effectLst/>
-              <a:latin typeface="Times New Roman" panose="02020603050405020304" pitchFamily="18" charset="0"/>
-              <a:cs typeface="Times New Roman" panose="02020603050405020304" pitchFamily="18" charset="0"/>
-            </a:endParaRPr>
-          </a:p>
-          <a:p>
-            <a:pPr marL="0" indent="0" algn="just">
-              <a:buNone/>
-            </a:pPr>
-            <a:r>
-              <a:rPr lang="pt-BR" sz="2400" b="0" i="0" dirty="0">
-                <a:solidFill>
-                  <a:srgbClr val="3B3934"/>
-                </a:solidFill>
-                <a:effectLst/>
-                <a:latin typeface="Times New Roman" panose="02020603050405020304" pitchFamily="18" charset="0"/>
-                <a:cs typeface="Times New Roman" panose="02020603050405020304" pitchFamily="18" charset="0"/>
-              </a:rPr>
-              <a:t>Tornar a </a:t>
-            </a:r>
-            <a:r>
-              <a:rPr lang="pt-BR" sz="2400" b="1" i="0" dirty="0">
-                <a:solidFill>
-                  <a:srgbClr val="3B3934"/>
-                </a:solidFill>
-                <a:effectLst/>
-                <a:latin typeface="Times New Roman" panose="02020603050405020304" pitchFamily="18" charset="0"/>
-                <a:cs typeface="Times New Roman" panose="02020603050405020304" pitchFamily="18" charset="0"/>
-              </a:rPr>
-              <a:t>manufatura</a:t>
-            </a:r>
-            <a:r>
-              <a:rPr lang="pt-BR" sz="2400" b="0" i="0" dirty="0">
-                <a:solidFill>
-                  <a:srgbClr val="3B3934"/>
-                </a:solidFill>
-                <a:effectLst/>
-                <a:latin typeface="Times New Roman" panose="02020603050405020304" pitchFamily="18" charset="0"/>
-                <a:cs typeface="Times New Roman" panose="02020603050405020304" pitchFamily="18" charset="0"/>
-              </a:rPr>
-              <a:t> mais </a:t>
-            </a:r>
-            <a:r>
-              <a:rPr lang="pt-BR" sz="2400" b="1" i="0" dirty="0">
-                <a:solidFill>
-                  <a:srgbClr val="FF0000"/>
-                </a:solidFill>
-                <a:effectLst/>
-                <a:latin typeface="Times New Roman" panose="02020603050405020304" pitchFamily="18" charset="0"/>
-                <a:cs typeface="Times New Roman" panose="02020603050405020304" pitchFamily="18" charset="0"/>
-              </a:rPr>
-              <a:t>rápida, eficiente e inteligente</a:t>
-            </a:r>
-            <a:r>
-              <a:rPr lang="pt-BR" sz="2400" b="0" i="0" dirty="0">
-                <a:solidFill>
-                  <a:srgbClr val="3B3934"/>
-                </a:solidFill>
-                <a:effectLst/>
-                <a:latin typeface="Times New Roman" panose="02020603050405020304" pitchFamily="18" charset="0"/>
-                <a:cs typeface="Times New Roman" panose="02020603050405020304" pitchFamily="18" charset="0"/>
-              </a:rPr>
-              <a:t>, por meio das </a:t>
-            </a:r>
-            <a:r>
-              <a:rPr lang="pt-BR" sz="2400" b="1" i="0" dirty="0">
-                <a:solidFill>
-                  <a:srgbClr val="3B3934"/>
-                </a:solidFill>
-                <a:effectLst/>
-                <a:latin typeface="Times New Roman" panose="02020603050405020304" pitchFamily="18" charset="0"/>
-                <a:cs typeface="Times New Roman" panose="02020603050405020304" pitchFamily="18" charset="0"/>
-              </a:rPr>
-              <a:t>tecnologias da informação</a:t>
-            </a:r>
-            <a:r>
-              <a:rPr lang="pt-BR" sz="2400" b="0" i="0" dirty="0">
-                <a:solidFill>
-                  <a:srgbClr val="3B3934"/>
-                </a:solidFill>
-                <a:effectLst/>
-                <a:latin typeface="Times New Roman" panose="02020603050405020304" pitchFamily="18" charset="0"/>
-                <a:cs typeface="Times New Roman" panose="02020603050405020304" pitchFamily="18" charset="0"/>
-              </a:rPr>
-              <a:t>.</a:t>
-            </a:r>
-            <a:endParaRPr lang="pt-BR" sz="2400" dirty="0">
-              <a:solidFill>
-                <a:schemeClr val="tx1"/>
-              </a:solidFill>
-              <a:latin typeface="Times New Roman" panose="02020603050405020304" pitchFamily="18" charset="0"/>
-              <a:cs typeface="Times New Roman" panose="02020603050405020304" pitchFamily="18" charset="0"/>
-            </a:endParaRPr>
-          </a:p>
-        </p:txBody>
-      </p:sp>
-    </p:spTree>
-    <p:extLst>
-      <p:ext uri="{BB962C8B-B14F-4D97-AF65-F5344CB8AC3E}">
-        <p14:creationId xmlns:p14="http://schemas.microsoft.com/office/powerpoint/2010/main" val="3244679594"/>
-      </p:ext>
-    </p:extLst>
   </p:cSld>
   <p:clrMapOvr>
     <a:masterClrMapping/>

</xml_diff>